<commit_message>
major changes, almost done
</commit_message>
<xml_diff>
--- a/instructions/screens.pptx
+++ b/instructions/screens.pptx
@@ -263,7 +263,7 @@
           <a:p>
             <a:fld id="{F5056942-F0FF-4877-B52A-AC2FF7EA9E26}" type="datetimeFigureOut">
               <a:rPr lang="en-CA" smtClean="0"/>
-              <a:t>2022-09-20</a:t>
+              <a:t>2024-10-01</a:t>
             </a:fld>
             <a:endParaRPr lang="en-CA"/>
           </a:p>
@@ -463,7 +463,7 @@
           <a:p>
             <a:fld id="{F5056942-F0FF-4877-B52A-AC2FF7EA9E26}" type="datetimeFigureOut">
               <a:rPr lang="en-CA" smtClean="0"/>
-              <a:t>2022-09-20</a:t>
+              <a:t>2024-10-01</a:t>
             </a:fld>
             <a:endParaRPr lang="en-CA"/>
           </a:p>
@@ -673,7 +673,7 @@
           <a:p>
             <a:fld id="{F5056942-F0FF-4877-B52A-AC2FF7EA9E26}" type="datetimeFigureOut">
               <a:rPr lang="en-CA" smtClean="0"/>
-              <a:t>2022-09-20</a:t>
+              <a:t>2024-10-01</a:t>
             </a:fld>
             <a:endParaRPr lang="en-CA"/>
           </a:p>
@@ -873,7 +873,7 @@
           <a:p>
             <a:fld id="{F5056942-F0FF-4877-B52A-AC2FF7EA9E26}" type="datetimeFigureOut">
               <a:rPr lang="en-CA" smtClean="0"/>
-              <a:t>2022-09-20</a:t>
+              <a:t>2024-10-01</a:t>
             </a:fld>
             <a:endParaRPr lang="en-CA"/>
           </a:p>
@@ -1149,7 +1149,7 @@
           <a:p>
             <a:fld id="{F5056942-F0FF-4877-B52A-AC2FF7EA9E26}" type="datetimeFigureOut">
               <a:rPr lang="en-CA" smtClean="0"/>
-              <a:t>2022-09-20</a:t>
+              <a:t>2024-10-01</a:t>
             </a:fld>
             <a:endParaRPr lang="en-CA"/>
           </a:p>
@@ -1417,7 +1417,7 @@
           <a:p>
             <a:fld id="{F5056942-F0FF-4877-B52A-AC2FF7EA9E26}" type="datetimeFigureOut">
               <a:rPr lang="en-CA" smtClean="0"/>
-              <a:t>2022-09-20</a:t>
+              <a:t>2024-10-01</a:t>
             </a:fld>
             <a:endParaRPr lang="en-CA"/>
           </a:p>
@@ -1832,7 +1832,7 @@
           <a:p>
             <a:fld id="{F5056942-F0FF-4877-B52A-AC2FF7EA9E26}" type="datetimeFigureOut">
               <a:rPr lang="en-CA" smtClean="0"/>
-              <a:t>2022-09-20</a:t>
+              <a:t>2024-10-01</a:t>
             </a:fld>
             <a:endParaRPr lang="en-CA"/>
           </a:p>
@@ -1974,7 +1974,7 @@
           <a:p>
             <a:fld id="{F5056942-F0FF-4877-B52A-AC2FF7EA9E26}" type="datetimeFigureOut">
               <a:rPr lang="en-CA" smtClean="0"/>
-              <a:t>2022-09-20</a:t>
+              <a:t>2024-10-01</a:t>
             </a:fld>
             <a:endParaRPr lang="en-CA"/>
           </a:p>
@@ -2087,7 +2087,7 @@
           <a:p>
             <a:fld id="{F5056942-F0FF-4877-B52A-AC2FF7EA9E26}" type="datetimeFigureOut">
               <a:rPr lang="en-CA" smtClean="0"/>
-              <a:t>2022-09-20</a:t>
+              <a:t>2024-10-01</a:t>
             </a:fld>
             <a:endParaRPr lang="en-CA"/>
           </a:p>
@@ -2400,7 +2400,7 @@
           <a:p>
             <a:fld id="{F5056942-F0FF-4877-B52A-AC2FF7EA9E26}" type="datetimeFigureOut">
               <a:rPr lang="en-CA" smtClean="0"/>
-              <a:t>2022-09-20</a:t>
+              <a:t>2024-10-01</a:t>
             </a:fld>
             <a:endParaRPr lang="en-CA"/>
           </a:p>
@@ -2689,7 +2689,7 @@
           <a:p>
             <a:fld id="{F5056942-F0FF-4877-B52A-AC2FF7EA9E26}" type="datetimeFigureOut">
               <a:rPr lang="en-CA" smtClean="0"/>
-              <a:t>2022-09-20</a:t>
+              <a:t>2024-10-01</a:t>
             </a:fld>
             <a:endParaRPr lang="en-CA"/>
           </a:p>
@@ -2932,7 +2932,7 @@
           <a:p>
             <a:fld id="{F5056942-F0FF-4877-B52A-AC2FF7EA9E26}" type="datetimeFigureOut">
               <a:rPr lang="en-CA" smtClean="0"/>
-              <a:t>2022-09-20</a:t>
+              <a:t>2024-10-01</a:t>
             </a:fld>
             <a:endParaRPr lang="en-CA"/>
           </a:p>
@@ -3420,12 +3420,292 @@
           </a:p>
         </p:txBody>
       </p:sp>
+      <p:sp>
+        <p:nvSpPr>
+          <p:cNvPr id="7" name="Rectangle 6">
+            <a:extLst>
+              <a:ext uri="{FF2B5EF4-FFF2-40B4-BE49-F238E27FC236}">
+                <a16:creationId xmlns:a16="http://schemas.microsoft.com/office/drawing/2014/main" id="{B77497FD-FA72-473C-B406-CBF0D03A675D}"/>
+              </a:ext>
+            </a:extLst>
+          </p:cNvPr>
+          <p:cNvSpPr/>
+          <p:nvPr/>
+        </p:nvSpPr>
+        <p:spPr>
+          <a:xfrm>
+            <a:off x="7732556" y="2695449"/>
+            <a:ext cx="3589234" cy="3345680"/>
+          </a:xfrm>
+          <a:prstGeom prst="rect">
+            <a:avLst/>
+          </a:prstGeom>
+          <a:noFill/>
+        </p:spPr>
+        <p:style>
+          <a:lnRef idx="2">
+            <a:schemeClr val="accent1">
+              <a:shade val="50000"/>
+            </a:schemeClr>
+          </a:lnRef>
+          <a:fillRef idx="1">
+            <a:schemeClr val="accent1"/>
+          </a:fillRef>
+          <a:effectRef idx="0">
+            <a:schemeClr val="accent1"/>
+          </a:effectRef>
+          <a:fontRef idx="minor">
+            <a:schemeClr val="lt1"/>
+          </a:fontRef>
+        </p:style>
+        <p:txBody>
+          <a:bodyPr rtlCol="0" anchor="ctr"/>
+          <a:lstStyle/>
+          <a:p>
+            <a:pPr algn="ctr"/>
+            <a:endParaRPr lang="en-CA">
+              <a:ln>
+                <a:solidFill>
+                  <a:schemeClr val="tx1"/>
+                </a:solidFill>
+              </a:ln>
+            </a:endParaRPr>
+          </a:p>
+        </p:txBody>
+      </p:sp>
+      <p:sp>
+        <p:nvSpPr>
+          <p:cNvPr id="8" name="TextBox 7">
+            <a:extLst>
+              <a:ext uri="{FF2B5EF4-FFF2-40B4-BE49-F238E27FC236}">
+                <a16:creationId xmlns:a16="http://schemas.microsoft.com/office/drawing/2014/main" id="{9CF10C8C-7DF1-42E5-BFE1-AB770B012545}"/>
+              </a:ext>
+            </a:extLst>
+          </p:cNvPr>
+          <p:cNvSpPr txBox="1"/>
+          <p:nvPr/>
+        </p:nvSpPr>
+        <p:spPr>
+          <a:xfrm>
+            <a:off x="8253849" y="2764732"/>
+            <a:ext cx="545342" cy="276999"/>
+          </a:xfrm>
+          <a:prstGeom prst="rect">
+            <a:avLst/>
+          </a:prstGeom>
+          <a:noFill/>
+        </p:spPr>
+        <p:txBody>
+          <a:bodyPr wrap="none" rtlCol="0">
+            <a:spAutoFit/>
+          </a:bodyPr>
+          <a:lstStyle/>
+          <a:p>
+            <a:r>
+              <a:rPr lang="en-CA" sz="1200" dirty="0"/>
+              <a:t>menu</a:t>
+            </a:r>
+          </a:p>
+        </p:txBody>
+      </p:sp>
+      <p:sp>
+        <p:nvSpPr>
+          <p:cNvPr id="9" name="TextBox 8">
+            <a:extLst>
+              <a:ext uri="{FF2B5EF4-FFF2-40B4-BE49-F238E27FC236}">
+                <a16:creationId xmlns:a16="http://schemas.microsoft.com/office/drawing/2014/main" id="{9F97718D-B3FF-40A0-833B-16FE160849F0}"/>
+              </a:ext>
+            </a:extLst>
+          </p:cNvPr>
+          <p:cNvSpPr txBox="1"/>
+          <p:nvPr/>
+        </p:nvSpPr>
+        <p:spPr>
+          <a:xfrm>
+            <a:off x="7732556" y="2773190"/>
+            <a:ext cx="454548" cy="276999"/>
+          </a:xfrm>
+          <a:prstGeom prst="rect">
+            <a:avLst/>
+          </a:prstGeom>
+          <a:noFill/>
+        </p:spPr>
+        <p:txBody>
+          <a:bodyPr wrap="none" rtlCol="0">
+            <a:spAutoFit/>
+          </a:bodyPr>
+          <a:lstStyle/>
+          <a:p>
+            <a:r>
+              <a:rPr lang="en-CA" sz="1200" dirty="0"/>
+              <a:t>logo</a:t>
+            </a:r>
+          </a:p>
+        </p:txBody>
+      </p:sp>
+      <p:sp>
+        <p:nvSpPr>
+          <p:cNvPr id="10" name="Rectangle 9">
+            <a:extLst>
+              <a:ext uri="{FF2B5EF4-FFF2-40B4-BE49-F238E27FC236}">
+                <a16:creationId xmlns:a16="http://schemas.microsoft.com/office/drawing/2014/main" id="{0A3D4BEF-0E58-4B68-A1EA-3B4BBC9BB65B}"/>
+              </a:ext>
+            </a:extLst>
+          </p:cNvPr>
+          <p:cNvSpPr/>
+          <p:nvPr/>
+        </p:nvSpPr>
+        <p:spPr>
+          <a:xfrm>
+            <a:off x="8350395" y="3162113"/>
+            <a:ext cx="2481742" cy="1257813"/>
+          </a:xfrm>
+          <a:prstGeom prst="rect">
+            <a:avLst/>
+          </a:prstGeom>
+          <a:solidFill>
+            <a:schemeClr val="accent1">
+              <a:lumMod val="20000"/>
+              <a:lumOff val="80000"/>
+            </a:schemeClr>
+          </a:solidFill>
+        </p:spPr>
+        <p:style>
+          <a:lnRef idx="2">
+            <a:schemeClr val="accent1">
+              <a:shade val="50000"/>
+            </a:schemeClr>
+          </a:lnRef>
+          <a:fillRef idx="1">
+            <a:schemeClr val="accent1"/>
+          </a:fillRef>
+          <a:effectRef idx="0">
+            <a:schemeClr val="accent1"/>
+          </a:effectRef>
+          <a:fontRef idx="minor">
+            <a:schemeClr val="lt1"/>
+          </a:fontRef>
+        </p:style>
+        <p:txBody>
+          <a:bodyPr rtlCol="0" anchor="ctr"/>
+          <a:lstStyle/>
+          <a:p>
+            <a:pPr algn="ctr"/>
+            <a:endParaRPr lang="en-CA"/>
+          </a:p>
+        </p:txBody>
+      </p:sp>
+      <p:sp>
+        <p:nvSpPr>
+          <p:cNvPr id="11" name="TextBox 10">
+            <a:extLst>
+              <a:ext uri="{FF2B5EF4-FFF2-40B4-BE49-F238E27FC236}">
+                <a16:creationId xmlns:a16="http://schemas.microsoft.com/office/drawing/2014/main" id="{A4169A7A-CC12-4ECE-8DC5-C9F223A3ED34}"/>
+              </a:ext>
+            </a:extLst>
+          </p:cNvPr>
+          <p:cNvSpPr txBox="1"/>
+          <p:nvPr/>
+        </p:nvSpPr>
+        <p:spPr>
+          <a:xfrm>
+            <a:off x="9030231" y="3652519"/>
+            <a:ext cx="936603" cy="276999"/>
+          </a:xfrm>
+          <a:prstGeom prst="rect">
+            <a:avLst/>
+          </a:prstGeom>
+          <a:noFill/>
+        </p:spPr>
+        <p:txBody>
+          <a:bodyPr wrap="none" rtlCol="0">
+            <a:spAutoFit/>
+          </a:bodyPr>
+          <a:lstStyle/>
+          <a:p>
+            <a:r>
+              <a:rPr lang="en-CA" sz="1200" dirty="0"/>
+              <a:t>large image</a:t>
+            </a:r>
+          </a:p>
+        </p:txBody>
+      </p:sp>
+      <p:sp>
+        <p:nvSpPr>
+          <p:cNvPr id="12" name="TextBox 11">
+            <a:extLst>
+              <a:ext uri="{FF2B5EF4-FFF2-40B4-BE49-F238E27FC236}">
+                <a16:creationId xmlns:a16="http://schemas.microsoft.com/office/drawing/2014/main" id="{1AF4734C-E79D-41B4-BC1A-0F05F3C1A370}"/>
+              </a:ext>
+            </a:extLst>
+          </p:cNvPr>
+          <p:cNvSpPr txBox="1"/>
+          <p:nvPr/>
+        </p:nvSpPr>
+        <p:spPr>
+          <a:xfrm>
+            <a:off x="8187104" y="4514811"/>
+            <a:ext cx="3117706" cy="276999"/>
+          </a:xfrm>
+          <a:prstGeom prst="rect">
+            <a:avLst/>
+          </a:prstGeom>
+          <a:noFill/>
+        </p:spPr>
+        <p:txBody>
+          <a:bodyPr wrap="square" rtlCol="0">
+            <a:spAutoFit/>
+          </a:bodyPr>
+          <a:lstStyle/>
+          <a:p>
+            <a:r>
+              <a:rPr lang="en-CA" sz="1200" dirty="0"/>
+              <a:t>Description, city, country, # likes, # comments</a:t>
+            </a:r>
+          </a:p>
+        </p:txBody>
+      </p:sp>
+      <p:sp>
+        <p:nvSpPr>
+          <p:cNvPr id="13" name="TextBox 12">
+            <a:extLst>
+              <a:ext uri="{FF2B5EF4-FFF2-40B4-BE49-F238E27FC236}">
+                <a16:creationId xmlns:a16="http://schemas.microsoft.com/office/drawing/2014/main" id="{37FC58B6-4209-4735-BBAA-FFB1E7E21A1B}"/>
+              </a:ext>
+            </a:extLst>
+          </p:cNvPr>
+          <p:cNvSpPr txBox="1"/>
+          <p:nvPr/>
+        </p:nvSpPr>
+        <p:spPr>
+          <a:xfrm>
+            <a:off x="7755905" y="2287247"/>
+            <a:ext cx="3336536" cy="369332"/>
+          </a:xfrm>
+          <a:prstGeom prst="rect">
+            <a:avLst/>
+          </a:prstGeom>
+          <a:noFill/>
+        </p:spPr>
+        <p:txBody>
+          <a:bodyPr wrap="square" rtlCol="0">
+            <a:spAutoFit/>
+          </a:bodyPr>
+          <a:lstStyle/>
+          <a:p>
+            <a:r>
+              <a:rPr lang="en-CA" dirty="0"/>
+              <a:t>Individual travel image page</a:t>
+            </a:r>
+          </a:p>
+        </p:txBody>
+      </p:sp>
       <p:grpSp>
         <p:nvGrpSpPr>
-          <p:cNvPr id="3" name="Group 2">
-            <a:extLst>
-              <a:ext uri="{FF2B5EF4-FFF2-40B4-BE49-F238E27FC236}">
-                <a16:creationId xmlns:a16="http://schemas.microsoft.com/office/drawing/2014/main" id="{49F0FC1C-B3DD-4E7B-BFA3-BC710ED0EA78}"/>
+          <p:cNvPr id="2" name="Group 1">
+            <a:extLst>
+              <a:ext uri="{FF2B5EF4-FFF2-40B4-BE49-F238E27FC236}">
+                <a16:creationId xmlns:a16="http://schemas.microsoft.com/office/drawing/2014/main" id="{09948717-1944-4A15-82FF-CC94B07983EB}"/>
               </a:ext>
             </a:extLst>
           </p:cNvPr>
@@ -3434,292 +3714,12 @@
         </p:nvGrpSpPr>
         <p:grpSpPr>
           <a:xfrm>
-            <a:off x="7732556" y="2287247"/>
-            <a:ext cx="3589234" cy="3764842"/>
-            <a:chOff x="5435126" y="1612877"/>
-            <a:chExt cx="3589234" cy="3764842"/>
+            <a:off x="8327926" y="4936034"/>
+            <a:ext cx="654346" cy="530758"/>
+            <a:chOff x="8327926" y="4950894"/>
+            <a:chExt cx="654346" cy="530758"/>
           </a:xfrm>
         </p:grpSpPr>
-        <p:sp>
-          <p:nvSpPr>
-            <p:cNvPr id="7" name="Rectangle 6">
-              <a:extLst>
-                <a:ext uri="{FF2B5EF4-FFF2-40B4-BE49-F238E27FC236}">
-                  <a16:creationId xmlns:a16="http://schemas.microsoft.com/office/drawing/2014/main" id="{B77497FD-FA72-473C-B406-CBF0D03A675D}"/>
-                </a:ext>
-              </a:extLst>
-            </p:cNvPr>
-            <p:cNvSpPr/>
-            <p:nvPr/>
-          </p:nvSpPr>
-          <p:spPr>
-            <a:xfrm>
-              <a:off x="5435126" y="2021079"/>
-              <a:ext cx="3589234" cy="3345680"/>
-            </a:xfrm>
-            <a:prstGeom prst="rect">
-              <a:avLst/>
-            </a:prstGeom>
-            <a:noFill/>
-          </p:spPr>
-          <p:style>
-            <a:lnRef idx="2">
-              <a:schemeClr val="accent1">
-                <a:shade val="50000"/>
-              </a:schemeClr>
-            </a:lnRef>
-            <a:fillRef idx="1">
-              <a:schemeClr val="accent1"/>
-            </a:fillRef>
-            <a:effectRef idx="0">
-              <a:schemeClr val="accent1"/>
-            </a:effectRef>
-            <a:fontRef idx="minor">
-              <a:schemeClr val="lt1"/>
-            </a:fontRef>
-          </p:style>
-          <p:txBody>
-            <a:bodyPr rtlCol="0" anchor="ctr"/>
-            <a:lstStyle/>
-            <a:p>
-              <a:pPr algn="ctr"/>
-              <a:endParaRPr lang="en-CA">
-                <a:ln>
-                  <a:solidFill>
-                    <a:schemeClr val="tx1"/>
-                  </a:solidFill>
-                </a:ln>
-              </a:endParaRPr>
-            </a:p>
-          </p:txBody>
-        </p:sp>
-        <p:sp>
-          <p:nvSpPr>
-            <p:cNvPr id="8" name="TextBox 7">
-              <a:extLst>
-                <a:ext uri="{FF2B5EF4-FFF2-40B4-BE49-F238E27FC236}">
-                  <a16:creationId xmlns:a16="http://schemas.microsoft.com/office/drawing/2014/main" id="{9CF10C8C-7DF1-42E5-BFE1-AB770B012545}"/>
-                </a:ext>
-              </a:extLst>
-            </p:cNvPr>
-            <p:cNvSpPr txBox="1"/>
-            <p:nvPr/>
-          </p:nvSpPr>
-          <p:spPr>
-            <a:xfrm>
-              <a:off x="5956419" y="2090362"/>
-              <a:ext cx="545342" cy="276999"/>
-            </a:xfrm>
-            <a:prstGeom prst="rect">
-              <a:avLst/>
-            </a:prstGeom>
-            <a:noFill/>
-          </p:spPr>
-          <p:txBody>
-            <a:bodyPr wrap="none" rtlCol="0">
-              <a:spAutoFit/>
-            </a:bodyPr>
-            <a:lstStyle/>
-            <a:p>
-              <a:r>
-                <a:rPr lang="en-CA" sz="1200" dirty="0"/>
-                <a:t>menu</a:t>
-              </a:r>
-            </a:p>
-          </p:txBody>
-        </p:sp>
-        <p:sp>
-          <p:nvSpPr>
-            <p:cNvPr id="9" name="TextBox 8">
-              <a:extLst>
-                <a:ext uri="{FF2B5EF4-FFF2-40B4-BE49-F238E27FC236}">
-                  <a16:creationId xmlns:a16="http://schemas.microsoft.com/office/drawing/2014/main" id="{9F97718D-B3FF-40A0-833B-16FE160849F0}"/>
-                </a:ext>
-              </a:extLst>
-            </p:cNvPr>
-            <p:cNvSpPr txBox="1"/>
-            <p:nvPr/>
-          </p:nvSpPr>
-          <p:spPr>
-            <a:xfrm>
-              <a:off x="5435126" y="2098820"/>
-              <a:ext cx="454548" cy="276999"/>
-            </a:xfrm>
-            <a:prstGeom prst="rect">
-              <a:avLst/>
-            </a:prstGeom>
-            <a:noFill/>
-          </p:spPr>
-          <p:txBody>
-            <a:bodyPr wrap="none" rtlCol="0">
-              <a:spAutoFit/>
-            </a:bodyPr>
-            <a:lstStyle/>
-            <a:p>
-              <a:r>
-                <a:rPr lang="en-CA" sz="1200" dirty="0"/>
-                <a:t>logo</a:t>
-              </a:r>
-            </a:p>
-          </p:txBody>
-        </p:sp>
-        <p:sp>
-          <p:nvSpPr>
-            <p:cNvPr id="10" name="Rectangle 9">
-              <a:extLst>
-                <a:ext uri="{FF2B5EF4-FFF2-40B4-BE49-F238E27FC236}">
-                  <a16:creationId xmlns:a16="http://schemas.microsoft.com/office/drawing/2014/main" id="{0A3D4BEF-0E58-4B68-A1EA-3B4BBC9BB65B}"/>
-                </a:ext>
-              </a:extLst>
-            </p:cNvPr>
-            <p:cNvSpPr/>
-            <p:nvPr/>
-          </p:nvSpPr>
-          <p:spPr>
-            <a:xfrm>
-              <a:off x="6052965" y="2487743"/>
-              <a:ext cx="2481742" cy="1257813"/>
-            </a:xfrm>
-            <a:prstGeom prst="rect">
-              <a:avLst/>
-            </a:prstGeom>
-            <a:solidFill>
-              <a:schemeClr val="accent1">
-                <a:lumMod val="20000"/>
-                <a:lumOff val="80000"/>
-              </a:schemeClr>
-            </a:solidFill>
-          </p:spPr>
-          <p:style>
-            <a:lnRef idx="2">
-              <a:schemeClr val="accent1">
-                <a:shade val="50000"/>
-              </a:schemeClr>
-            </a:lnRef>
-            <a:fillRef idx="1">
-              <a:schemeClr val="accent1"/>
-            </a:fillRef>
-            <a:effectRef idx="0">
-              <a:schemeClr val="accent1"/>
-            </a:effectRef>
-            <a:fontRef idx="minor">
-              <a:schemeClr val="lt1"/>
-            </a:fontRef>
-          </p:style>
-          <p:txBody>
-            <a:bodyPr rtlCol="0" anchor="ctr"/>
-            <a:lstStyle/>
-            <a:p>
-              <a:pPr algn="ctr"/>
-              <a:endParaRPr lang="en-CA"/>
-            </a:p>
-          </p:txBody>
-        </p:sp>
-        <p:sp>
-          <p:nvSpPr>
-            <p:cNvPr id="11" name="TextBox 10">
-              <a:extLst>
-                <a:ext uri="{FF2B5EF4-FFF2-40B4-BE49-F238E27FC236}">
-                  <a16:creationId xmlns:a16="http://schemas.microsoft.com/office/drawing/2014/main" id="{A4169A7A-CC12-4ECE-8DC5-C9F223A3ED34}"/>
-                </a:ext>
-              </a:extLst>
-            </p:cNvPr>
-            <p:cNvSpPr txBox="1"/>
-            <p:nvPr/>
-          </p:nvSpPr>
-          <p:spPr>
-            <a:xfrm>
-              <a:off x="6732801" y="2978149"/>
-              <a:ext cx="936603" cy="276999"/>
-            </a:xfrm>
-            <a:prstGeom prst="rect">
-              <a:avLst/>
-            </a:prstGeom>
-            <a:noFill/>
-          </p:spPr>
-          <p:txBody>
-            <a:bodyPr wrap="none" rtlCol="0">
-              <a:spAutoFit/>
-            </a:bodyPr>
-            <a:lstStyle/>
-            <a:p>
-              <a:r>
-                <a:rPr lang="en-CA" sz="1200" dirty="0"/>
-                <a:t>large image</a:t>
-              </a:r>
-            </a:p>
-          </p:txBody>
-        </p:sp>
-        <p:sp>
-          <p:nvSpPr>
-            <p:cNvPr id="12" name="TextBox 11">
-              <a:extLst>
-                <a:ext uri="{FF2B5EF4-FFF2-40B4-BE49-F238E27FC236}">
-                  <a16:creationId xmlns:a16="http://schemas.microsoft.com/office/drawing/2014/main" id="{1AF4734C-E79D-41B4-BC1A-0F05F3C1A370}"/>
-                </a:ext>
-              </a:extLst>
-            </p:cNvPr>
-            <p:cNvSpPr txBox="1"/>
-            <p:nvPr/>
-          </p:nvSpPr>
-          <p:spPr>
-            <a:xfrm>
-              <a:off x="5889674" y="3840441"/>
-              <a:ext cx="3117706" cy="276999"/>
-            </a:xfrm>
-            <a:prstGeom prst="rect">
-              <a:avLst/>
-            </a:prstGeom>
-            <a:noFill/>
-          </p:spPr>
-          <p:txBody>
-            <a:bodyPr wrap="square" rtlCol="0">
-              <a:spAutoFit/>
-            </a:bodyPr>
-            <a:lstStyle/>
-            <a:p>
-              <a:r>
-                <a:rPr lang="en-CA" sz="1200" dirty="0"/>
-                <a:t>Description, city, country, # likes, # comments</a:t>
-              </a:r>
-            </a:p>
-          </p:txBody>
-        </p:sp>
-        <p:sp>
-          <p:nvSpPr>
-            <p:cNvPr id="13" name="TextBox 12">
-              <a:extLst>
-                <a:ext uri="{FF2B5EF4-FFF2-40B4-BE49-F238E27FC236}">
-                  <a16:creationId xmlns:a16="http://schemas.microsoft.com/office/drawing/2014/main" id="{37FC58B6-4209-4735-BBAA-FFB1E7E21A1B}"/>
-                </a:ext>
-              </a:extLst>
-            </p:cNvPr>
-            <p:cNvSpPr txBox="1"/>
-            <p:nvPr/>
-          </p:nvSpPr>
-          <p:spPr>
-            <a:xfrm>
-              <a:off x="5458475" y="1612877"/>
-              <a:ext cx="3336536" cy="369332"/>
-            </a:xfrm>
-            <a:prstGeom prst="rect">
-              <a:avLst/>
-            </a:prstGeom>
-            <a:noFill/>
-          </p:spPr>
-          <p:txBody>
-            <a:bodyPr wrap="square" rtlCol="0">
-              <a:spAutoFit/>
-            </a:bodyPr>
-            <a:lstStyle/>
-            <a:p>
-              <a:r>
-                <a:rPr lang="en-CA" dirty="0"/>
-                <a:t>Individual travel image page</a:t>
-              </a:r>
-            </a:p>
-          </p:txBody>
-        </p:sp>
         <p:sp>
           <p:nvSpPr>
             <p:cNvPr id="14" name="Rectangle 13">
@@ -3734,8 +3734,8 @@
           </p:nvSpPr>
           <p:spPr>
             <a:xfrm>
-              <a:off x="6052965" y="4212325"/>
-              <a:ext cx="1210960" cy="769873"/>
+              <a:off x="8350396" y="4950894"/>
+              <a:ext cx="565174" cy="530758"/>
             </a:xfrm>
             <a:prstGeom prst="rect">
               <a:avLst/>
@@ -3786,8 +3786,8 @@
           </p:nvSpPr>
           <p:spPr>
             <a:xfrm>
-              <a:off x="6190143" y="4469347"/>
-              <a:ext cx="841834" cy="276999"/>
+              <a:off x="8327926" y="4985970"/>
+              <a:ext cx="654346" cy="430887"/>
             </a:xfrm>
             <a:prstGeom prst="rect">
               <a:avLst/>
@@ -3801,49 +3801,54 @@
             <a:lstStyle/>
             <a:p>
               <a:r>
-                <a:rPr lang="en-CA" sz="1200" dirty="0"/>
-                <a:t>Static map</a:t>
+                <a:rPr lang="en-CA" sz="1050" dirty="0"/>
+                <a:t>Related </a:t>
+              </a:r>
+            </a:p>
+            <a:p>
+              <a:r>
+                <a:rPr lang="en-CA" sz="1050" dirty="0"/>
+                <a:t>Image 1</a:t>
               </a:r>
             </a:p>
           </p:txBody>
         </p:sp>
-        <p:sp>
-          <p:nvSpPr>
-            <p:cNvPr id="20" name="TextBox 19">
-              <a:extLst>
-                <a:ext uri="{FF2B5EF4-FFF2-40B4-BE49-F238E27FC236}">
-                  <a16:creationId xmlns:a16="http://schemas.microsoft.com/office/drawing/2014/main" id="{9F97718D-B3FF-40A0-833B-16FE160849F0}"/>
-                </a:ext>
-              </a:extLst>
-            </p:cNvPr>
-            <p:cNvSpPr txBox="1"/>
-            <p:nvPr/>
-          </p:nvSpPr>
-          <p:spPr>
-            <a:xfrm>
-              <a:off x="5528516" y="5100720"/>
-              <a:ext cx="1089623" cy="276999"/>
-            </a:xfrm>
-            <a:prstGeom prst="rect">
-              <a:avLst/>
-            </a:prstGeom>
-            <a:noFill/>
-          </p:spPr>
-          <p:txBody>
-            <a:bodyPr wrap="square" rtlCol="0">
-              <a:spAutoFit/>
-            </a:bodyPr>
-            <a:lstStyle/>
-            <a:p>
-              <a:r>
-                <a:rPr lang="en-CA" sz="1200" dirty="0" smtClean="0"/>
-                <a:t>footer</a:t>
-              </a:r>
-              <a:endParaRPr lang="en-CA" sz="1200" dirty="0"/>
-            </a:p>
-          </p:txBody>
-        </p:sp>
       </p:grpSp>
+      <p:sp>
+        <p:nvSpPr>
+          <p:cNvPr id="20" name="TextBox 19">
+            <a:extLst>
+              <a:ext uri="{FF2B5EF4-FFF2-40B4-BE49-F238E27FC236}">
+                <a16:creationId xmlns:a16="http://schemas.microsoft.com/office/drawing/2014/main" id="{9F97718D-B3FF-40A0-833B-16FE160849F0}"/>
+              </a:ext>
+            </a:extLst>
+          </p:cNvPr>
+          <p:cNvSpPr txBox="1"/>
+          <p:nvPr/>
+        </p:nvSpPr>
+        <p:spPr>
+          <a:xfrm>
+            <a:off x="7825946" y="5775090"/>
+            <a:ext cx="1089623" cy="276999"/>
+          </a:xfrm>
+          <a:prstGeom prst="rect">
+            <a:avLst/>
+          </a:prstGeom>
+          <a:noFill/>
+        </p:spPr>
+        <p:txBody>
+          <a:bodyPr wrap="square" rtlCol="0">
+            <a:spAutoFit/>
+          </a:bodyPr>
+          <a:lstStyle/>
+          <a:p>
+            <a:r>
+              <a:rPr lang="en-CA" sz="1200" dirty="0"/>
+              <a:t>footer</a:t>
+            </a:r>
+          </a:p>
+        </p:txBody>
+      </p:sp>
       <p:sp>
         <p:nvSpPr>
           <p:cNvPr id="16" name="TextBox 15">
@@ -4072,6 +4077,348 @@
           </a:p>
         </p:txBody>
       </p:sp>
+      <p:grpSp>
+        <p:nvGrpSpPr>
+          <p:cNvPr id="27" name="Group 26">
+            <a:extLst>
+              <a:ext uri="{FF2B5EF4-FFF2-40B4-BE49-F238E27FC236}">
+                <a16:creationId xmlns:a16="http://schemas.microsoft.com/office/drawing/2014/main" id="{7DC4E762-9C2A-4002-8B50-2A263392E1E5}"/>
+              </a:ext>
+            </a:extLst>
+          </p:cNvPr>
+          <p:cNvGrpSpPr/>
+          <p:nvPr/>
+        </p:nvGrpSpPr>
+        <p:grpSpPr>
+          <a:xfrm>
+            <a:off x="8968425" y="4936034"/>
+            <a:ext cx="654346" cy="530758"/>
+            <a:chOff x="8327926" y="4950894"/>
+            <a:chExt cx="654346" cy="530758"/>
+          </a:xfrm>
+        </p:grpSpPr>
+        <p:sp>
+          <p:nvSpPr>
+            <p:cNvPr id="28" name="Rectangle 27">
+              <a:extLst>
+                <a:ext uri="{FF2B5EF4-FFF2-40B4-BE49-F238E27FC236}">
+                  <a16:creationId xmlns:a16="http://schemas.microsoft.com/office/drawing/2014/main" id="{FC035455-F05E-4FA0-A5A4-499E3BABA2E4}"/>
+                </a:ext>
+              </a:extLst>
+            </p:cNvPr>
+            <p:cNvSpPr/>
+            <p:nvPr/>
+          </p:nvSpPr>
+          <p:spPr>
+            <a:xfrm>
+              <a:off x="8350396" y="4950894"/>
+              <a:ext cx="565174" cy="530758"/>
+            </a:xfrm>
+            <a:prstGeom prst="rect">
+              <a:avLst/>
+            </a:prstGeom>
+            <a:solidFill>
+              <a:schemeClr val="accent1">
+                <a:lumMod val="20000"/>
+                <a:lumOff val="80000"/>
+              </a:schemeClr>
+            </a:solidFill>
+          </p:spPr>
+          <p:style>
+            <a:lnRef idx="2">
+              <a:schemeClr val="accent1">
+                <a:shade val="50000"/>
+              </a:schemeClr>
+            </a:lnRef>
+            <a:fillRef idx="1">
+              <a:schemeClr val="accent1"/>
+            </a:fillRef>
+            <a:effectRef idx="0">
+              <a:schemeClr val="accent1"/>
+            </a:effectRef>
+            <a:fontRef idx="minor">
+              <a:schemeClr val="lt1"/>
+            </a:fontRef>
+          </p:style>
+          <p:txBody>
+            <a:bodyPr rtlCol="0" anchor="ctr"/>
+            <a:lstStyle/>
+            <a:p>
+              <a:pPr algn="ctr"/>
+              <a:endParaRPr lang="en-CA"/>
+            </a:p>
+          </p:txBody>
+        </p:sp>
+        <p:sp>
+          <p:nvSpPr>
+            <p:cNvPr id="29" name="TextBox 28">
+              <a:extLst>
+                <a:ext uri="{FF2B5EF4-FFF2-40B4-BE49-F238E27FC236}">
+                  <a16:creationId xmlns:a16="http://schemas.microsoft.com/office/drawing/2014/main" id="{910A8D60-FA4B-4FA7-BA89-523A25B43FFB}"/>
+                </a:ext>
+              </a:extLst>
+            </p:cNvPr>
+            <p:cNvSpPr txBox="1"/>
+            <p:nvPr/>
+          </p:nvSpPr>
+          <p:spPr>
+            <a:xfrm>
+              <a:off x="8327926" y="4985970"/>
+              <a:ext cx="654346" cy="430887"/>
+            </a:xfrm>
+            <a:prstGeom prst="rect">
+              <a:avLst/>
+            </a:prstGeom>
+            <a:noFill/>
+          </p:spPr>
+          <p:txBody>
+            <a:bodyPr wrap="none" rtlCol="0">
+              <a:spAutoFit/>
+            </a:bodyPr>
+            <a:lstStyle/>
+            <a:p>
+              <a:r>
+                <a:rPr lang="en-CA" sz="1050" dirty="0"/>
+                <a:t>Related </a:t>
+              </a:r>
+            </a:p>
+            <a:p>
+              <a:r>
+                <a:rPr lang="en-CA" sz="1050" dirty="0"/>
+                <a:t>Image 2</a:t>
+              </a:r>
+            </a:p>
+          </p:txBody>
+        </p:sp>
+      </p:grpSp>
+      <p:grpSp>
+        <p:nvGrpSpPr>
+          <p:cNvPr id="30" name="Group 29">
+            <a:extLst>
+              <a:ext uri="{FF2B5EF4-FFF2-40B4-BE49-F238E27FC236}">
+                <a16:creationId xmlns:a16="http://schemas.microsoft.com/office/drawing/2014/main" id="{DC268FC5-E6CE-419F-A32C-0B38487EC1F8}"/>
+              </a:ext>
+            </a:extLst>
+          </p:cNvPr>
+          <p:cNvGrpSpPr/>
+          <p:nvPr/>
+        </p:nvGrpSpPr>
+        <p:grpSpPr>
+          <a:xfrm>
+            <a:off x="9608924" y="4936034"/>
+            <a:ext cx="654346" cy="530758"/>
+            <a:chOff x="8327926" y="4950894"/>
+            <a:chExt cx="654346" cy="530758"/>
+          </a:xfrm>
+        </p:grpSpPr>
+        <p:sp>
+          <p:nvSpPr>
+            <p:cNvPr id="31" name="Rectangle 30">
+              <a:extLst>
+                <a:ext uri="{FF2B5EF4-FFF2-40B4-BE49-F238E27FC236}">
+                  <a16:creationId xmlns:a16="http://schemas.microsoft.com/office/drawing/2014/main" id="{1436D745-9E4E-4DAD-B6F8-E4B3B37CDD2D}"/>
+                </a:ext>
+              </a:extLst>
+            </p:cNvPr>
+            <p:cNvSpPr/>
+            <p:nvPr/>
+          </p:nvSpPr>
+          <p:spPr>
+            <a:xfrm>
+              <a:off x="8350396" y="4950894"/>
+              <a:ext cx="565174" cy="530758"/>
+            </a:xfrm>
+            <a:prstGeom prst="rect">
+              <a:avLst/>
+            </a:prstGeom>
+            <a:solidFill>
+              <a:schemeClr val="accent1">
+                <a:lumMod val="20000"/>
+                <a:lumOff val="80000"/>
+              </a:schemeClr>
+            </a:solidFill>
+          </p:spPr>
+          <p:style>
+            <a:lnRef idx="2">
+              <a:schemeClr val="accent1">
+                <a:shade val="50000"/>
+              </a:schemeClr>
+            </a:lnRef>
+            <a:fillRef idx="1">
+              <a:schemeClr val="accent1"/>
+            </a:fillRef>
+            <a:effectRef idx="0">
+              <a:schemeClr val="accent1"/>
+            </a:effectRef>
+            <a:fontRef idx="minor">
+              <a:schemeClr val="lt1"/>
+            </a:fontRef>
+          </p:style>
+          <p:txBody>
+            <a:bodyPr rtlCol="0" anchor="ctr"/>
+            <a:lstStyle/>
+            <a:p>
+              <a:pPr algn="ctr"/>
+              <a:endParaRPr lang="en-CA"/>
+            </a:p>
+          </p:txBody>
+        </p:sp>
+        <p:sp>
+          <p:nvSpPr>
+            <p:cNvPr id="32" name="TextBox 31">
+              <a:extLst>
+                <a:ext uri="{FF2B5EF4-FFF2-40B4-BE49-F238E27FC236}">
+                  <a16:creationId xmlns:a16="http://schemas.microsoft.com/office/drawing/2014/main" id="{18533098-B589-46E9-B629-1394944B8D5C}"/>
+                </a:ext>
+              </a:extLst>
+            </p:cNvPr>
+            <p:cNvSpPr txBox="1"/>
+            <p:nvPr/>
+          </p:nvSpPr>
+          <p:spPr>
+            <a:xfrm>
+              <a:off x="8327926" y="4985970"/>
+              <a:ext cx="654346" cy="430887"/>
+            </a:xfrm>
+            <a:prstGeom prst="rect">
+              <a:avLst/>
+            </a:prstGeom>
+            <a:noFill/>
+          </p:spPr>
+          <p:txBody>
+            <a:bodyPr wrap="none" rtlCol="0">
+              <a:spAutoFit/>
+            </a:bodyPr>
+            <a:lstStyle/>
+            <a:p>
+              <a:r>
+                <a:rPr lang="en-CA" sz="1050" dirty="0"/>
+                <a:t>Related </a:t>
+              </a:r>
+            </a:p>
+            <a:p>
+              <a:r>
+                <a:rPr lang="en-CA" sz="1050" dirty="0"/>
+                <a:t>Image 3</a:t>
+              </a:r>
+            </a:p>
+          </p:txBody>
+        </p:sp>
+      </p:grpSp>
+      <p:grpSp>
+        <p:nvGrpSpPr>
+          <p:cNvPr id="33" name="Group 32">
+            <a:extLst>
+              <a:ext uri="{FF2B5EF4-FFF2-40B4-BE49-F238E27FC236}">
+                <a16:creationId xmlns:a16="http://schemas.microsoft.com/office/drawing/2014/main" id="{58863F81-D778-4A6B-80B5-0C3AD13F2B0E}"/>
+              </a:ext>
+            </a:extLst>
+          </p:cNvPr>
+          <p:cNvGrpSpPr/>
+          <p:nvPr/>
+        </p:nvGrpSpPr>
+        <p:grpSpPr>
+          <a:xfrm>
+            <a:off x="10249424" y="4936034"/>
+            <a:ext cx="654346" cy="530758"/>
+            <a:chOff x="8327926" y="4950894"/>
+            <a:chExt cx="654346" cy="530758"/>
+          </a:xfrm>
+        </p:grpSpPr>
+        <p:sp>
+          <p:nvSpPr>
+            <p:cNvPr id="34" name="Rectangle 33">
+              <a:extLst>
+                <a:ext uri="{FF2B5EF4-FFF2-40B4-BE49-F238E27FC236}">
+                  <a16:creationId xmlns:a16="http://schemas.microsoft.com/office/drawing/2014/main" id="{145D6C49-8554-404F-8A99-0D4F28526A01}"/>
+                </a:ext>
+              </a:extLst>
+            </p:cNvPr>
+            <p:cNvSpPr/>
+            <p:nvPr/>
+          </p:nvSpPr>
+          <p:spPr>
+            <a:xfrm>
+              <a:off x="8350396" y="4950894"/>
+              <a:ext cx="565174" cy="530758"/>
+            </a:xfrm>
+            <a:prstGeom prst="rect">
+              <a:avLst/>
+            </a:prstGeom>
+            <a:solidFill>
+              <a:schemeClr val="accent1">
+                <a:lumMod val="20000"/>
+                <a:lumOff val="80000"/>
+              </a:schemeClr>
+            </a:solidFill>
+          </p:spPr>
+          <p:style>
+            <a:lnRef idx="2">
+              <a:schemeClr val="accent1">
+                <a:shade val="50000"/>
+              </a:schemeClr>
+            </a:lnRef>
+            <a:fillRef idx="1">
+              <a:schemeClr val="accent1"/>
+            </a:fillRef>
+            <a:effectRef idx="0">
+              <a:schemeClr val="accent1"/>
+            </a:effectRef>
+            <a:fontRef idx="minor">
+              <a:schemeClr val="lt1"/>
+            </a:fontRef>
+          </p:style>
+          <p:txBody>
+            <a:bodyPr rtlCol="0" anchor="ctr"/>
+            <a:lstStyle/>
+            <a:p>
+              <a:pPr algn="ctr"/>
+              <a:endParaRPr lang="en-CA"/>
+            </a:p>
+          </p:txBody>
+        </p:sp>
+        <p:sp>
+          <p:nvSpPr>
+            <p:cNvPr id="35" name="TextBox 34">
+              <a:extLst>
+                <a:ext uri="{FF2B5EF4-FFF2-40B4-BE49-F238E27FC236}">
+                  <a16:creationId xmlns:a16="http://schemas.microsoft.com/office/drawing/2014/main" id="{0C0DC4CF-698E-4FC4-A139-AF3E1EC0F66F}"/>
+                </a:ext>
+              </a:extLst>
+            </p:cNvPr>
+            <p:cNvSpPr txBox="1"/>
+            <p:nvPr/>
+          </p:nvSpPr>
+          <p:spPr>
+            <a:xfrm>
+              <a:off x="8327926" y="4985970"/>
+              <a:ext cx="654346" cy="430887"/>
+            </a:xfrm>
+            <a:prstGeom prst="rect">
+              <a:avLst/>
+            </a:prstGeom>
+            <a:noFill/>
+          </p:spPr>
+          <p:txBody>
+            <a:bodyPr wrap="none" rtlCol="0">
+              <a:spAutoFit/>
+            </a:bodyPr>
+            <a:lstStyle/>
+            <a:p>
+              <a:r>
+                <a:rPr lang="en-CA" sz="1050" dirty="0"/>
+                <a:t>Related </a:t>
+              </a:r>
+            </a:p>
+            <a:p>
+              <a:r>
+                <a:rPr lang="en-CA" sz="1050" dirty="0"/>
+                <a:t>Image 4</a:t>
+              </a:r>
+            </a:p>
+          </p:txBody>
+        </p:sp>
+      </p:grpSp>
     </p:spTree>
     <p:extLst>
       <p:ext uri="{BB962C8B-B14F-4D97-AF65-F5344CB8AC3E}">
@@ -4082,13 +4429,6 @@
   <p:clrMapOvr>
     <a:masterClrMapping/>
   </p:clrMapOvr>
-  <p:timing>
-    <p:tnLst>
-      <p:par>
-        <p:cTn id="1" dur="indefinite" restart="never" nodeType="tmRoot"/>
-      </p:par>
-    </p:tnLst>
-  </p:timing>
 </p:sld>
 </file>
 

</xml_diff>